<commit_message>
Update Anonymous_Hack the Future.pptx
</commit_message>
<xml_diff>
--- a/Citi - IBM Hackathon - Anonymous/Anonymous_Hack the Future.pptx
+++ b/Citi - IBM Hackathon - Anonymous/Anonymous_Hack the Future.pptx
@@ -33836,7 +33836,7 @@
             <a:pPr algn="l"/>
             <a:r>
               <a:rPr lang="en-US" sz="1100" b="1" dirty="0"/>
-              <a:t>Use Cases:</a:t>
+              <a:t>Use Cases &amp; Salient Features :</a:t>
             </a:r>
           </a:p>
           <a:p>
@@ -36423,12 +36423,9 @@
 </file>
 
 <file path=customXml/item1.xml><?xml version="1.0" encoding="utf-8"?>
-<?mso-contentType ?>
-<FormTemplates xmlns="http://schemas.microsoft.com/sharepoint/v3/contenttype/forms">
-  <Display>DocumentLibraryForm</Display>
-  <Edit>DocumentLibraryForm</Edit>
-  <New>DocumentLibraryForm</New>
-</FormTemplates>
+<p:properties xmlns:p="http://schemas.microsoft.com/office/2006/metadata/properties" xmlns:xsi="http://www.w3.org/2001/XMLSchema-instance">
+  <documentManagement/>
+</p:properties>
 </file>
 
 <file path=customXml/item2.xml><?xml version="1.0" encoding="utf-8"?>
@@ -36564,15 +36561,26 @@
 </file>
 
 <file path=customXml/item3.xml><?xml version="1.0" encoding="utf-8"?>
-<p:properties xmlns:p="http://schemas.microsoft.com/office/2006/metadata/properties" xmlns:xsi="http://www.w3.org/2001/XMLSchema-instance">
-  <documentManagement/>
-</p:properties>
+<?mso-contentType ?>
+<FormTemplates xmlns="http://schemas.microsoft.com/sharepoint/v3/contenttype/forms">
+  <Display>DocumentLibraryForm</Display>
+  <Edit>DocumentLibraryForm</Edit>
+  <New>DocumentLibraryForm</New>
+</FormTemplates>
 </file>
 
 <file path=customXml/itemProps1.xml><?xml version="1.0" encoding="utf-8"?>
-<ds:datastoreItem xmlns:ds="http://schemas.openxmlformats.org/officeDocument/2006/customXml" ds:itemID="{8ABB6DC8-0142-4676-96FE-F1693BA95046}">
+<ds:datastoreItem xmlns:ds="http://schemas.openxmlformats.org/officeDocument/2006/customXml" ds:itemID="{24559248-63FA-4C6E-A37D-96FF4426E5C5}">
   <ds:schemaRefs>
-    <ds:schemaRef ds:uri="http://schemas.microsoft.com/sharepoint/v3/contenttype/forms"/>
+    <ds:schemaRef ds:uri="http://schemas.microsoft.com/office/2006/documentManagement/types"/>
+    <ds:schemaRef ds:uri="http://purl.org/dc/dcmitype/"/>
+    <ds:schemaRef ds:uri="http://schemas.microsoft.com/office/2006/metadata/properties"/>
+    <ds:schemaRef ds:uri="http://purl.org/dc/elements/1.1/"/>
+    <ds:schemaRef ds:uri="http://purl.org/dc/terms/"/>
+    <ds:schemaRef ds:uri="http://schemas.openxmlformats.org/package/2006/metadata/core-properties"/>
+    <ds:schemaRef ds:uri="http://schemas.microsoft.com/office/infopath/2007/PartnerControls"/>
+    <ds:schemaRef ds:uri="59adf32a-ef96-4ec2-94c8-876cf435d4ef"/>
+    <ds:schemaRef ds:uri="http://www.w3.org/XML/1998/namespace"/>
   </ds:schemaRefs>
 </ds:datastoreItem>
 </file>
@@ -36596,17 +36604,9 @@
 </file>
 
 <file path=customXml/itemProps3.xml><?xml version="1.0" encoding="utf-8"?>
-<ds:datastoreItem xmlns:ds="http://schemas.openxmlformats.org/officeDocument/2006/customXml" ds:itemID="{24559248-63FA-4C6E-A37D-96FF4426E5C5}">
+<ds:datastoreItem xmlns:ds="http://schemas.openxmlformats.org/officeDocument/2006/customXml" ds:itemID="{8ABB6DC8-0142-4676-96FE-F1693BA95046}">
   <ds:schemaRefs>
-    <ds:schemaRef ds:uri="http://schemas.microsoft.com/office/2006/documentManagement/types"/>
-    <ds:schemaRef ds:uri="http://purl.org/dc/dcmitype/"/>
-    <ds:schemaRef ds:uri="http://schemas.microsoft.com/office/2006/metadata/properties"/>
-    <ds:schemaRef ds:uri="http://purl.org/dc/elements/1.1/"/>
-    <ds:schemaRef ds:uri="http://purl.org/dc/terms/"/>
-    <ds:schemaRef ds:uri="http://schemas.openxmlformats.org/package/2006/metadata/core-properties"/>
-    <ds:schemaRef ds:uri="http://schemas.microsoft.com/office/infopath/2007/PartnerControls"/>
-    <ds:schemaRef ds:uri="59adf32a-ef96-4ec2-94c8-876cf435d4ef"/>
-    <ds:schemaRef ds:uri="http://www.w3.org/XML/1998/namespace"/>
+    <ds:schemaRef ds:uri="http://schemas.microsoft.com/sharepoint/v3/contenttype/forms"/>
   </ds:schemaRefs>
 </ds:datastoreItem>
 </file>
</xml_diff>